<commit_message>
update channel estimator diagram
</commit_message>
<xml_diff>
--- a/doc/channel_estimator.pptx
+++ b/doc/channel_estimator.pptx
@@ -261,7 +261,7 @@
           <a:p>
             <a:fld id="{0647E4D3-4269-40FF-ADD2-F433546F1734}" type="datetimeFigureOut">
               <a:rPr lang="en-GB" smtClean="0"/>
-              <a:t>27/02/2023</a:t>
+              <a:t>28/02/2023</a:t>
             </a:fld>
             <a:endParaRPr lang="en-GB"/>
           </a:p>
@@ -461,7 +461,7 @@
           <a:p>
             <a:fld id="{0647E4D3-4269-40FF-ADD2-F433546F1734}" type="datetimeFigureOut">
               <a:rPr lang="en-GB" smtClean="0"/>
-              <a:t>27/02/2023</a:t>
+              <a:t>28/02/2023</a:t>
             </a:fld>
             <a:endParaRPr lang="en-GB"/>
           </a:p>
@@ -671,7 +671,7 @@
           <a:p>
             <a:fld id="{0647E4D3-4269-40FF-ADD2-F433546F1734}" type="datetimeFigureOut">
               <a:rPr lang="en-GB" smtClean="0"/>
-              <a:t>27/02/2023</a:t>
+              <a:t>28/02/2023</a:t>
             </a:fld>
             <a:endParaRPr lang="en-GB"/>
           </a:p>
@@ -871,7 +871,7 @@
           <a:p>
             <a:fld id="{0647E4D3-4269-40FF-ADD2-F433546F1734}" type="datetimeFigureOut">
               <a:rPr lang="en-GB" smtClean="0"/>
-              <a:t>27/02/2023</a:t>
+              <a:t>28/02/2023</a:t>
             </a:fld>
             <a:endParaRPr lang="en-GB"/>
           </a:p>
@@ -1147,7 +1147,7 @@
           <a:p>
             <a:fld id="{0647E4D3-4269-40FF-ADD2-F433546F1734}" type="datetimeFigureOut">
               <a:rPr lang="en-GB" smtClean="0"/>
-              <a:t>27/02/2023</a:t>
+              <a:t>28/02/2023</a:t>
             </a:fld>
             <a:endParaRPr lang="en-GB"/>
           </a:p>
@@ -1415,7 +1415,7 @@
           <a:p>
             <a:fld id="{0647E4D3-4269-40FF-ADD2-F433546F1734}" type="datetimeFigureOut">
               <a:rPr lang="en-GB" smtClean="0"/>
-              <a:t>27/02/2023</a:t>
+              <a:t>28/02/2023</a:t>
             </a:fld>
             <a:endParaRPr lang="en-GB"/>
           </a:p>
@@ -1830,7 +1830,7 @@
           <a:p>
             <a:fld id="{0647E4D3-4269-40FF-ADD2-F433546F1734}" type="datetimeFigureOut">
               <a:rPr lang="en-GB" smtClean="0"/>
-              <a:t>27/02/2023</a:t>
+              <a:t>28/02/2023</a:t>
             </a:fld>
             <a:endParaRPr lang="en-GB"/>
           </a:p>
@@ -1972,7 +1972,7 @@
           <a:p>
             <a:fld id="{0647E4D3-4269-40FF-ADD2-F433546F1734}" type="datetimeFigureOut">
               <a:rPr lang="en-GB" smtClean="0"/>
-              <a:t>27/02/2023</a:t>
+              <a:t>28/02/2023</a:t>
             </a:fld>
             <a:endParaRPr lang="en-GB"/>
           </a:p>
@@ -2085,7 +2085,7 @@
           <a:p>
             <a:fld id="{0647E4D3-4269-40FF-ADD2-F433546F1734}" type="datetimeFigureOut">
               <a:rPr lang="en-GB" smtClean="0"/>
-              <a:t>27/02/2023</a:t>
+              <a:t>28/02/2023</a:t>
             </a:fld>
             <a:endParaRPr lang="en-GB"/>
           </a:p>
@@ -2398,7 +2398,7 @@
           <a:p>
             <a:fld id="{0647E4D3-4269-40FF-ADD2-F433546F1734}" type="datetimeFigureOut">
               <a:rPr lang="en-GB" smtClean="0"/>
-              <a:t>27/02/2023</a:t>
+              <a:t>28/02/2023</a:t>
             </a:fld>
             <a:endParaRPr lang="en-GB"/>
           </a:p>
@@ -2687,7 +2687,7 @@
           <a:p>
             <a:fld id="{0647E4D3-4269-40FF-ADD2-F433546F1734}" type="datetimeFigureOut">
               <a:rPr lang="en-GB" smtClean="0"/>
-              <a:t>27/02/2023</a:t>
+              <a:t>28/02/2023</a:t>
             </a:fld>
             <a:endParaRPr lang="en-GB"/>
           </a:p>
@@ -2930,7 +2930,7 @@
           <a:p>
             <a:fld id="{0647E4D3-4269-40FF-ADD2-F433546F1734}" type="datetimeFigureOut">
               <a:rPr lang="en-GB" smtClean="0"/>
-              <a:t>27/02/2023</a:t>
+              <a:t>28/02/2023</a:t>
             </a:fld>
             <a:endParaRPr lang="en-GB"/>
           </a:p>
@@ -4357,8 +4357,8 @@
         </p:nvCxnSpPr>
         <p:spPr>
           <a:xfrm>
-            <a:off x="3788020" y="5224568"/>
-            <a:ext cx="3526766" cy="0"/>
+            <a:off x="5404932" y="4750714"/>
+            <a:ext cx="1909854" cy="0"/>
           </a:xfrm>
           <a:prstGeom prst="straightConnector1">
             <a:avLst/>
@@ -4675,7 +4675,7 @@
         </p:nvCxnSpPr>
         <p:spPr>
           <a:xfrm flipV="1">
-            <a:off x="8107266" y="4616851"/>
+            <a:off x="8107266" y="4746659"/>
             <a:ext cx="1909854" cy="4055"/>
           </a:xfrm>
           <a:prstGeom prst="straightConnector1">
@@ -5341,45 +5341,6 @@
       </p:cxnSp>
       <p:cxnSp>
         <p:nvCxnSpPr>
-          <p:cNvPr id="206" name="Gerader Verbinder 205">
-            <a:extLst>
-              <a:ext uri="{FF2B5EF4-FFF2-40B4-BE49-F238E27FC236}">
-                <a16:creationId xmlns:a16="http://schemas.microsoft.com/office/drawing/2014/main" id="{9C29815D-DE30-C812-149E-F047588103CB}"/>
-              </a:ext>
-            </a:extLst>
-          </p:cNvPr>
-          <p:cNvCxnSpPr>
-            <a:cxnSpLocks/>
-          </p:cNvCxnSpPr>
-          <p:nvPr/>
-        </p:nvCxnSpPr>
-        <p:spPr>
-          <a:xfrm flipV="1">
-            <a:off x="3788020" y="4741012"/>
-            <a:ext cx="0" cy="483556"/>
-          </a:xfrm>
-          <a:prstGeom prst="line">
-            <a:avLst/>
-          </a:prstGeom>
-          <a:ln w="19050"/>
-        </p:spPr>
-        <p:style>
-          <a:lnRef idx="1">
-            <a:schemeClr val="accent1"/>
-          </a:lnRef>
-          <a:fillRef idx="0">
-            <a:schemeClr val="accent1"/>
-          </a:fillRef>
-          <a:effectRef idx="0">
-            <a:schemeClr val="accent1"/>
-          </a:effectRef>
-          <a:fontRef idx="minor">
-            <a:schemeClr val="tx1"/>
-          </a:fontRef>
-        </p:style>
-      </p:cxnSp>
-      <p:cxnSp>
-        <p:nvCxnSpPr>
           <p:cNvPr id="2" name="Straight Arrow Connector 11">
             <a:extLst>
               <a:ext uri="{FF2B5EF4-FFF2-40B4-BE49-F238E27FC236}">
@@ -5587,7 +5548,7 @@
         </p:nvSpPr>
         <p:spPr>
           <a:xfrm>
-            <a:off x="8874710" y="4343907"/>
+            <a:off x="8659864" y="4490048"/>
             <a:ext cx="780983" cy="276999"/>
           </a:xfrm>
           <a:prstGeom prst="rect">
@@ -5624,9 +5585,9 @@
           <p:nvPr/>
         </p:nvCxnSpPr>
         <p:spPr>
-          <a:xfrm flipV="1">
-            <a:off x="8403413" y="4620906"/>
-            <a:ext cx="0" cy="1114862"/>
+          <a:xfrm flipH="1" flipV="1">
+            <a:off x="8387585" y="4748686"/>
+            <a:ext cx="15828" cy="987082"/>
           </a:xfrm>
           <a:prstGeom prst="line">
             <a:avLst/>
@@ -5739,7 +5700,7 @@
         </p:nvSpPr>
         <p:spPr>
           <a:xfrm>
-            <a:off x="4636454" y="4969089"/>
+            <a:off x="5455072" y="4478351"/>
             <a:ext cx="1730410" cy="276999"/>
           </a:xfrm>
           <a:prstGeom prst="rect">

</xml_diff>

<commit_message>
update overview and channel estimator diagram
</commit_message>
<xml_diff>
--- a/doc/channel_estimator.pptx
+++ b/doc/channel_estimator.pptx
@@ -261,7 +261,7 @@
           <a:p>
             <a:fld id="{0647E4D3-4269-40FF-ADD2-F433546F1734}" type="datetimeFigureOut">
               <a:rPr lang="en-GB" smtClean="0"/>
-              <a:t>28/02/2023</a:t>
+              <a:t>03/03/2023</a:t>
             </a:fld>
             <a:endParaRPr lang="en-GB"/>
           </a:p>
@@ -315,7 +315,7 @@
           <a:p>
             <a:fld id="{1991B810-A44B-42D8-B2B0-10522A071A3E}" type="slidenum">
               <a:rPr lang="en-GB" smtClean="0"/>
-              <a:t>‹Nr.›</a:t>
+              <a:t>‹#›</a:t>
             </a:fld>
             <a:endParaRPr lang="en-GB"/>
           </a:p>
@@ -461,7 +461,7 @@
           <a:p>
             <a:fld id="{0647E4D3-4269-40FF-ADD2-F433546F1734}" type="datetimeFigureOut">
               <a:rPr lang="en-GB" smtClean="0"/>
-              <a:t>28/02/2023</a:t>
+              <a:t>03/03/2023</a:t>
             </a:fld>
             <a:endParaRPr lang="en-GB"/>
           </a:p>
@@ -515,7 +515,7 @@
           <a:p>
             <a:fld id="{1991B810-A44B-42D8-B2B0-10522A071A3E}" type="slidenum">
               <a:rPr lang="en-GB" smtClean="0"/>
-              <a:t>‹Nr.›</a:t>
+              <a:t>‹#›</a:t>
             </a:fld>
             <a:endParaRPr lang="en-GB"/>
           </a:p>
@@ -671,7 +671,7 @@
           <a:p>
             <a:fld id="{0647E4D3-4269-40FF-ADD2-F433546F1734}" type="datetimeFigureOut">
               <a:rPr lang="en-GB" smtClean="0"/>
-              <a:t>28/02/2023</a:t>
+              <a:t>03/03/2023</a:t>
             </a:fld>
             <a:endParaRPr lang="en-GB"/>
           </a:p>
@@ -725,7 +725,7 @@
           <a:p>
             <a:fld id="{1991B810-A44B-42D8-B2B0-10522A071A3E}" type="slidenum">
               <a:rPr lang="en-GB" smtClean="0"/>
-              <a:t>‹Nr.›</a:t>
+              <a:t>‹#›</a:t>
             </a:fld>
             <a:endParaRPr lang="en-GB"/>
           </a:p>
@@ -871,7 +871,7 @@
           <a:p>
             <a:fld id="{0647E4D3-4269-40FF-ADD2-F433546F1734}" type="datetimeFigureOut">
               <a:rPr lang="en-GB" smtClean="0"/>
-              <a:t>28/02/2023</a:t>
+              <a:t>03/03/2023</a:t>
             </a:fld>
             <a:endParaRPr lang="en-GB"/>
           </a:p>
@@ -925,7 +925,7 @@
           <a:p>
             <a:fld id="{1991B810-A44B-42D8-B2B0-10522A071A3E}" type="slidenum">
               <a:rPr lang="en-GB" smtClean="0"/>
-              <a:t>‹Nr.›</a:t>
+              <a:t>‹#›</a:t>
             </a:fld>
             <a:endParaRPr lang="en-GB"/>
           </a:p>
@@ -1147,7 +1147,7 @@
           <a:p>
             <a:fld id="{0647E4D3-4269-40FF-ADD2-F433546F1734}" type="datetimeFigureOut">
               <a:rPr lang="en-GB" smtClean="0"/>
-              <a:t>28/02/2023</a:t>
+              <a:t>03/03/2023</a:t>
             </a:fld>
             <a:endParaRPr lang="en-GB"/>
           </a:p>
@@ -1201,7 +1201,7 @@
           <a:p>
             <a:fld id="{1991B810-A44B-42D8-B2B0-10522A071A3E}" type="slidenum">
               <a:rPr lang="en-GB" smtClean="0"/>
-              <a:t>‹Nr.›</a:t>
+              <a:t>‹#›</a:t>
             </a:fld>
             <a:endParaRPr lang="en-GB"/>
           </a:p>
@@ -1415,7 +1415,7 @@
           <a:p>
             <a:fld id="{0647E4D3-4269-40FF-ADD2-F433546F1734}" type="datetimeFigureOut">
               <a:rPr lang="en-GB" smtClean="0"/>
-              <a:t>28/02/2023</a:t>
+              <a:t>03/03/2023</a:t>
             </a:fld>
             <a:endParaRPr lang="en-GB"/>
           </a:p>
@@ -1469,7 +1469,7 @@
           <a:p>
             <a:fld id="{1991B810-A44B-42D8-B2B0-10522A071A3E}" type="slidenum">
               <a:rPr lang="en-GB" smtClean="0"/>
-              <a:t>‹Nr.›</a:t>
+              <a:t>‹#›</a:t>
             </a:fld>
             <a:endParaRPr lang="en-GB"/>
           </a:p>
@@ -1830,7 +1830,7 @@
           <a:p>
             <a:fld id="{0647E4D3-4269-40FF-ADD2-F433546F1734}" type="datetimeFigureOut">
               <a:rPr lang="en-GB" smtClean="0"/>
-              <a:t>28/02/2023</a:t>
+              <a:t>03/03/2023</a:t>
             </a:fld>
             <a:endParaRPr lang="en-GB"/>
           </a:p>
@@ -1884,7 +1884,7 @@
           <a:p>
             <a:fld id="{1991B810-A44B-42D8-B2B0-10522A071A3E}" type="slidenum">
               <a:rPr lang="en-GB" smtClean="0"/>
-              <a:t>‹Nr.›</a:t>
+              <a:t>‹#›</a:t>
             </a:fld>
             <a:endParaRPr lang="en-GB"/>
           </a:p>
@@ -1972,7 +1972,7 @@
           <a:p>
             <a:fld id="{0647E4D3-4269-40FF-ADD2-F433546F1734}" type="datetimeFigureOut">
               <a:rPr lang="en-GB" smtClean="0"/>
-              <a:t>28/02/2023</a:t>
+              <a:t>03/03/2023</a:t>
             </a:fld>
             <a:endParaRPr lang="en-GB"/>
           </a:p>
@@ -2026,7 +2026,7 @@
           <a:p>
             <a:fld id="{1991B810-A44B-42D8-B2B0-10522A071A3E}" type="slidenum">
               <a:rPr lang="en-GB" smtClean="0"/>
-              <a:t>‹Nr.›</a:t>
+              <a:t>‹#›</a:t>
             </a:fld>
             <a:endParaRPr lang="en-GB"/>
           </a:p>
@@ -2085,7 +2085,7 @@
           <a:p>
             <a:fld id="{0647E4D3-4269-40FF-ADD2-F433546F1734}" type="datetimeFigureOut">
               <a:rPr lang="en-GB" smtClean="0"/>
-              <a:t>28/02/2023</a:t>
+              <a:t>03/03/2023</a:t>
             </a:fld>
             <a:endParaRPr lang="en-GB"/>
           </a:p>
@@ -2139,7 +2139,7 @@
           <a:p>
             <a:fld id="{1991B810-A44B-42D8-B2B0-10522A071A3E}" type="slidenum">
               <a:rPr lang="en-GB" smtClean="0"/>
-              <a:t>‹Nr.›</a:t>
+              <a:t>‹#›</a:t>
             </a:fld>
             <a:endParaRPr lang="en-GB"/>
           </a:p>
@@ -2398,7 +2398,7 @@
           <a:p>
             <a:fld id="{0647E4D3-4269-40FF-ADD2-F433546F1734}" type="datetimeFigureOut">
               <a:rPr lang="en-GB" smtClean="0"/>
-              <a:t>28/02/2023</a:t>
+              <a:t>03/03/2023</a:t>
             </a:fld>
             <a:endParaRPr lang="en-GB"/>
           </a:p>
@@ -2452,7 +2452,7 @@
           <a:p>
             <a:fld id="{1991B810-A44B-42D8-B2B0-10522A071A3E}" type="slidenum">
               <a:rPr lang="en-GB" smtClean="0"/>
-              <a:t>‹Nr.›</a:t>
+              <a:t>‹#›</a:t>
             </a:fld>
             <a:endParaRPr lang="en-GB"/>
           </a:p>
@@ -2687,7 +2687,7 @@
           <a:p>
             <a:fld id="{0647E4D3-4269-40FF-ADD2-F433546F1734}" type="datetimeFigureOut">
               <a:rPr lang="en-GB" smtClean="0"/>
-              <a:t>28/02/2023</a:t>
+              <a:t>03/03/2023</a:t>
             </a:fld>
             <a:endParaRPr lang="en-GB"/>
           </a:p>
@@ -2741,7 +2741,7 @@
           <a:p>
             <a:fld id="{1991B810-A44B-42D8-B2B0-10522A071A3E}" type="slidenum">
               <a:rPr lang="en-GB" smtClean="0"/>
-              <a:t>‹Nr.›</a:t>
+              <a:t>‹#›</a:t>
             </a:fld>
             <a:endParaRPr lang="en-GB"/>
           </a:p>
@@ -2930,7 +2930,7 @@
           <a:p>
             <a:fld id="{0647E4D3-4269-40FF-ADD2-F433546F1734}" type="datetimeFigureOut">
               <a:rPr lang="en-GB" smtClean="0"/>
-              <a:t>28/02/2023</a:t>
+              <a:t>03/03/2023</a:t>
             </a:fld>
             <a:endParaRPr lang="en-GB"/>
           </a:p>
@@ -3020,7 +3020,7 @@
           <a:p>
             <a:fld id="{1991B810-A44B-42D8-B2B0-10522A071A3E}" type="slidenum">
               <a:rPr lang="en-GB" smtClean="0"/>
-              <a:t>‹Nr.›</a:t>
+              <a:t>‹#›</a:t>
             </a:fld>
             <a:endParaRPr lang="en-GB"/>
           </a:p>
@@ -3440,8 +3440,8 @@
         </p:nvCxnSpPr>
         <p:spPr>
           <a:xfrm>
-            <a:off x="562820" y="3501975"/>
-            <a:ext cx="739507" cy="1246"/>
+            <a:off x="173968" y="3446554"/>
+            <a:ext cx="1124197" cy="0"/>
           </a:xfrm>
           <a:prstGeom prst="straightConnector1">
             <a:avLst/>
@@ -3928,8 +3928,8 @@
         </p:nvCxnSpPr>
         <p:spPr>
           <a:xfrm>
-            <a:off x="661479" y="4741012"/>
-            <a:ext cx="2000557" cy="9702"/>
+            <a:off x="1031615" y="4746659"/>
+            <a:ext cx="1630421" cy="4055"/>
           </a:xfrm>
           <a:prstGeom prst="straightConnector1">
             <a:avLst/>
@@ -3969,7 +3969,7 @@
         </p:nvCxnSpPr>
         <p:spPr>
           <a:xfrm flipV="1">
-            <a:off x="661479" y="3493994"/>
+            <a:off x="1033153" y="3493994"/>
             <a:ext cx="0" cy="1247018"/>
           </a:xfrm>
           <a:prstGeom prst="line">
@@ -5055,174 +5055,6 @@
       </p:sp>
       <p:cxnSp>
         <p:nvCxnSpPr>
-          <p:cNvPr id="172" name="Straight Arrow Connector 11">
-            <a:extLst>
-              <a:ext uri="{FF2B5EF4-FFF2-40B4-BE49-F238E27FC236}">
-                <a16:creationId xmlns:a16="http://schemas.microsoft.com/office/drawing/2014/main" id="{944F9124-D309-A81C-6844-2C0F0C01FE3A}"/>
-              </a:ext>
-            </a:extLst>
-          </p:cNvPr>
-          <p:cNvCxnSpPr>
-            <a:cxnSpLocks/>
-          </p:cNvCxnSpPr>
-          <p:nvPr/>
-        </p:nvCxnSpPr>
-        <p:spPr>
-          <a:xfrm>
-            <a:off x="582914" y="2449623"/>
-            <a:ext cx="3330879" cy="0"/>
-          </a:xfrm>
-          <a:prstGeom prst="straightConnector1">
-            <a:avLst/>
-          </a:prstGeom>
-          <a:ln w="19050">
-            <a:solidFill>
-              <a:srgbClr val="FFC000"/>
-            </a:solidFill>
-            <a:tailEnd type="none"/>
-          </a:ln>
-        </p:spPr>
-        <p:style>
-          <a:lnRef idx="1">
-            <a:schemeClr val="accent1"/>
-          </a:lnRef>
-          <a:fillRef idx="0">
-            <a:schemeClr val="accent1"/>
-          </a:fillRef>
-          <a:effectRef idx="0">
-            <a:schemeClr val="accent1"/>
-          </a:effectRef>
-          <a:fontRef idx="minor">
-            <a:schemeClr val="tx1"/>
-          </a:fontRef>
-        </p:style>
-      </p:cxnSp>
-      <p:sp>
-        <p:nvSpPr>
-          <p:cNvPr id="173" name="TextBox 70">
-            <a:extLst>
-              <a:ext uri="{FF2B5EF4-FFF2-40B4-BE49-F238E27FC236}">
-                <a16:creationId xmlns:a16="http://schemas.microsoft.com/office/drawing/2014/main" id="{9EFC2F31-5640-6C6C-7BE2-D50E51D65FF0}"/>
-              </a:ext>
-            </a:extLst>
-          </p:cNvPr>
-          <p:cNvSpPr txBox="1"/>
-          <p:nvPr/>
-        </p:nvSpPr>
-        <p:spPr>
-          <a:xfrm>
-            <a:off x="819486" y="2190277"/>
-            <a:ext cx="889603" cy="276999"/>
-          </a:xfrm>
-          <a:prstGeom prst="rect">
-            <a:avLst/>
-          </a:prstGeom>
-          <a:noFill/>
-        </p:spPr>
-        <p:txBody>
-          <a:bodyPr wrap="none" rtlCol="0">
-            <a:spAutoFit/>
-          </a:bodyPr>
-          <a:lstStyle/>
-          <a:p>
-            <a:r>
-              <a:rPr lang="en-US" sz="1200"/>
-              <a:t>PBCH_start</a:t>
-            </a:r>
-            <a:endParaRPr lang="en-GB" sz="1200" dirty="0"/>
-          </a:p>
-        </p:txBody>
-      </p:sp>
-      <p:cxnSp>
-        <p:nvCxnSpPr>
-          <p:cNvPr id="175" name="Straight Arrow Connector 11">
-            <a:extLst>
-              <a:ext uri="{FF2B5EF4-FFF2-40B4-BE49-F238E27FC236}">
-                <a16:creationId xmlns:a16="http://schemas.microsoft.com/office/drawing/2014/main" id="{4725BD1C-0E39-92F8-8912-E59E0AD8EB00}"/>
-              </a:ext>
-            </a:extLst>
-          </p:cNvPr>
-          <p:cNvCxnSpPr>
-            <a:cxnSpLocks/>
-          </p:cNvCxnSpPr>
-          <p:nvPr/>
-        </p:nvCxnSpPr>
-        <p:spPr>
-          <a:xfrm>
-            <a:off x="3913793" y="3197342"/>
-            <a:ext cx="328191" cy="1615"/>
-          </a:xfrm>
-          <a:prstGeom prst="straightConnector1">
-            <a:avLst/>
-          </a:prstGeom>
-          <a:ln w="19050">
-            <a:solidFill>
-              <a:srgbClr val="FFC000"/>
-            </a:solidFill>
-            <a:tailEnd type="triangle"/>
-          </a:ln>
-        </p:spPr>
-        <p:style>
-          <a:lnRef idx="1">
-            <a:schemeClr val="accent1"/>
-          </a:lnRef>
-          <a:fillRef idx="0">
-            <a:schemeClr val="accent1"/>
-          </a:fillRef>
-          <a:effectRef idx="0">
-            <a:schemeClr val="accent1"/>
-          </a:effectRef>
-          <a:fontRef idx="minor">
-            <a:schemeClr val="tx1"/>
-          </a:fontRef>
-        </p:style>
-      </p:cxnSp>
-      <p:cxnSp>
-        <p:nvCxnSpPr>
-          <p:cNvPr id="179" name="Straight Arrow Connector 11">
-            <a:extLst>
-              <a:ext uri="{FF2B5EF4-FFF2-40B4-BE49-F238E27FC236}">
-                <a16:creationId xmlns:a16="http://schemas.microsoft.com/office/drawing/2014/main" id="{197AA515-A630-DA4C-DC85-39717D9A7216}"/>
-              </a:ext>
-            </a:extLst>
-          </p:cNvPr>
-          <p:cNvCxnSpPr>
-            <a:cxnSpLocks/>
-          </p:cNvCxnSpPr>
-          <p:nvPr/>
-        </p:nvCxnSpPr>
-        <p:spPr>
-          <a:xfrm flipV="1">
-            <a:off x="3913793" y="2444134"/>
-            <a:ext cx="0" cy="751937"/>
-          </a:xfrm>
-          <a:prstGeom prst="straightConnector1">
-            <a:avLst/>
-          </a:prstGeom>
-          <a:ln w="19050">
-            <a:solidFill>
-              <a:srgbClr val="FFC000"/>
-            </a:solidFill>
-            <a:tailEnd type="none"/>
-          </a:ln>
-        </p:spPr>
-        <p:style>
-          <a:lnRef idx="1">
-            <a:schemeClr val="accent1"/>
-          </a:lnRef>
-          <a:fillRef idx="0">
-            <a:schemeClr val="accent1"/>
-          </a:fillRef>
-          <a:effectRef idx="0">
-            <a:schemeClr val="accent1"/>
-          </a:effectRef>
-          <a:fontRef idx="minor">
-            <a:schemeClr val="tx1"/>
-          </a:fontRef>
-        </p:style>
-      </p:cxnSp>
-      <p:cxnSp>
-        <p:nvCxnSpPr>
           <p:cNvPr id="186" name="Straight Arrow Connector 11">
             <a:extLst>
               <a:ext uri="{FF2B5EF4-FFF2-40B4-BE49-F238E27FC236}">
@@ -5508,8 +5340,8 @@
         </p:nvSpPr>
         <p:spPr>
           <a:xfrm>
-            <a:off x="796165" y="4478352"/>
-            <a:ext cx="1730410" cy="276999"/>
+            <a:off x="986390" y="6140579"/>
+            <a:ext cx="1972463" cy="276999"/>
           </a:xfrm>
           <a:prstGeom prst="rect">
             <a:avLst/>
@@ -5524,11 +5356,11 @@
           <a:p>
             <a:r>
               <a:rPr lang="en-US" sz="1200" dirty="0"/>
-              <a:t>16 bit I</a:t>
-            </a:r>
-            <a:r>
-              <a:rPr lang="en-US" sz="1200"/>
-              <a:t>/Q + symbol_type</a:t>
+              <a:t>(1) with symbol type in </a:t>
+            </a:r>
+            <a:r>
+              <a:rPr lang="en-US" sz="1200" dirty="0" err="1"/>
+              <a:t>tuser</a:t>
             </a:r>
             <a:endParaRPr lang="en-GB" sz="1200" dirty="0"/>
           </a:p>
@@ -5679,7 +5511,7 @@
           <a:lstStyle/>
           <a:p>
             <a:r>
-              <a:rPr lang="en-US" sz="1200"/>
+              <a:rPr lang="en-US" sz="1200" dirty="0" err="1"/>
               <a:t>symbol_type</a:t>
             </a:r>
             <a:endParaRPr lang="en-GB" sz="1200" dirty="0"/>
@@ -5700,8 +5532,8 @@
         </p:nvSpPr>
         <p:spPr>
           <a:xfrm>
-            <a:off x="5455072" y="4478351"/>
-            <a:ext cx="1730410" cy="276999"/>
+            <a:off x="5944840" y="4490048"/>
+            <a:ext cx="780983" cy="276999"/>
           </a:xfrm>
           <a:prstGeom prst="rect">
             <a:avLst/>
@@ -5716,11 +5548,7 @@
           <a:p>
             <a:r>
               <a:rPr lang="en-US" sz="1200" dirty="0"/>
-              <a:t>16 bit I</a:t>
-            </a:r>
-            <a:r>
-              <a:rPr lang="en-US" sz="1200"/>
-              <a:t>/Q + symbol_type</a:t>
+              <a:t>16 bit I/Q</a:t>
             </a:r>
             <a:endParaRPr lang="en-GB" sz="1200" dirty="0"/>
           </a:p>
@@ -5740,7 +5568,7 @@
         </p:nvSpPr>
         <p:spPr>
           <a:xfrm>
-            <a:off x="576704" y="3236248"/>
+            <a:off x="140229" y="3203788"/>
             <a:ext cx="780983" cy="276999"/>
           </a:xfrm>
           <a:prstGeom prst="rect">
@@ -5756,11 +5584,237 @@
           <a:p>
             <a:r>
               <a:rPr lang="en-US" sz="1200" dirty="0"/>
-              <a:t>16 bit </a:t>
-            </a:r>
-            <a:r>
-              <a:rPr lang="en-US" sz="1200"/>
-              <a:t>I/Q</a:t>
+              <a:t>16 bit I/Q</a:t>
+            </a:r>
+            <a:endParaRPr lang="en-GB" sz="1200" dirty="0"/>
+          </a:p>
+        </p:txBody>
+      </p:sp>
+      <p:cxnSp>
+        <p:nvCxnSpPr>
+          <p:cNvPr id="6" name="Straight Arrow Connector 68">
+            <a:extLst>
+              <a:ext uri="{FF2B5EF4-FFF2-40B4-BE49-F238E27FC236}">
+                <a16:creationId xmlns:a16="http://schemas.microsoft.com/office/drawing/2014/main" id="{190188DE-3699-7FC9-4F04-29860DF0145C}"/>
+              </a:ext>
+            </a:extLst>
+          </p:cNvPr>
+          <p:cNvCxnSpPr>
+            <a:cxnSpLocks/>
+          </p:cNvCxnSpPr>
+          <p:nvPr/>
+        </p:nvCxnSpPr>
+        <p:spPr>
+          <a:xfrm>
+            <a:off x="3131958" y="1825659"/>
+            <a:ext cx="317232" cy="0"/>
+          </a:xfrm>
+          <a:prstGeom prst="straightConnector1">
+            <a:avLst/>
+          </a:prstGeom>
+          <a:ln w="19050">
+            <a:tailEnd type="triangle"/>
+          </a:ln>
+        </p:spPr>
+        <p:style>
+          <a:lnRef idx="1">
+            <a:schemeClr val="accent1"/>
+          </a:lnRef>
+          <a:fillRef idx="0">
+            <a:schemeClr val="accent1"/>
+          </a:fillRef>
+          <a:effectRef idx="0">
+            <a:schemeClr val="accent1"/>
+          </a:effectRef>
+          <a:fontRef idx="minor">
+            <a:schemeClr val="tx1"/>
+          </a:fontRef>
+        </p:style>
+      </p:cxnSp>
+      <p:cxnSp>
+        <p:nvCxnSpPr>
+          <p:cNvPr id="12" name="Gerader Verbinder 130">
+            <a:extLst>
+              <a:ext uri="{FF2B5EF4-FFF2-40B4-BE49-F238E27FC236}">
+                <a16:creationId xmlns:a16="http://schemas.microsoft.com/office/drawing/2014/main" id="{ED2B6C96-2255-D04F-153C-F737E3D0B08C}"/>
+              </a:ext>
+            </a:extLst>
+          </p:cNvPr>
+          <p:cNvCxnSpPr>
+            <a:cxnSpLocks/>
+          </p:cNvCxnSpPr>
+          <p:nvPr/>
+        </p:nvCxnSpPr>
+        <p:spPr>
+          <a:xfrm flipV="1">
+            <a:off x="3131958" y="1823274"/>
+            <a:ext cx="0" cy="642835"/>
+          </a:xfrm>
+          <a:prstGeom prst="line">
+            <a:avLst/>
+          </a:prstGeom>
+          <a:ln w="19050"/>
+        </p:spPr>
+        <p:style>
+          <a:lnRef idx="1">
+            <a:schemeClr val="accent1"/>
+          </a:lnRef>
+          <a:fillRef idx="0">
+            <a:schemeClr val="accent1"/>
+          </a:fillRef>
+          <a:effectRef idx="0">
+            <a:schemeClr val="accent1"/>
+          </a:effectRef>
+          <a:fontRef idx="minor">
+            <a:schemeClr val="tx1"/>
+          </a:fontRef>
+        </p:style>
+      </p:cxnSp>
+      <p:cxnSp>
+        <p:nvCxnSpPr>
+          <p:cNvPr id="15" name="Gerader Verbinder 130">
+            <a:extLst>
+              <a:ext uri="{FF2B5EF4-FFF2-40B4-BE49-F238E27FC236}">
+                <a16:creationId xmlns:a16="http://schemas.microsoft.com/office/drawing/2014/main" id="{1B6EFDD8-7435-6084-B4B5-446F572B5263}"/>
+              </a:ext>
+            </a:extLst>
+          </p:cNvPr>
+          <p:cNvCxnSpPr>
+            <a:cxnSpLocks/>
+          </p:cNvCxnSpPr>
+          <p:nvPr/>
+        </p:nvCxnSpPr>
+        <p:spPr>
+          <a:xfrm flipH="1">
+            <a:off x="1033153" y="2466109"/>
+            <a:ext cx="2098805" cy="0"/>
+          </a:xfrm>
+          <a:prstGeom prst="line">
+            <a:avLst/>
+          </a:prstGeom>
+          <a:ln w="19050"/>
+        </p:spPr>
+        <p:style>
+          <a:lnRef idx="1">
+            <a:schemeClr val="accent1"/>
+          </a:lnRef>
+          <a:fillRef idx="0">
+            <a:schemeClr val="accent1"/>
+          </a:fillRef>
+          <a:effectRef idx="0">
+            <a:schemeClr val="accent1"/>
+          </a:effectRef>
+          <a:fontRef idx="minor">
+            <a:schemeClr val="tx1"/>
+          </a:fontRef>
+        </p:style>
+      </p:cxnSp>
+      <p:cxnSp>
+        <p:nvCxnSpPr>
+          <p:cNvPr id="20" name="Gerader Verbinder 130">
+            <a:extLst>
+              <a:ext uri="{FF2B5EF4-FFF2-40B4-BE49-F238E27FC236}">
+                <a16:creationId xmlns:a16="http://schemas.microsoft.com/office/drawing/2014/main" id="{09BCA29E-9B93-D98F-1470-15E842F9A0DD}"/>
+              </a:ext>
+            </a:extLst>
+          </p:cNvPr>
+          <p:cNvCxnSpPr>
+            <a:cxnSpLocks/>
+          </p:cNvCxnSpPr>
+          <p:nvPr/>
+        </p:nvCxnSpPr>
+        <p:spPr>
+          <a:xfrm flipV="1">
+            <a:off x="1033153" y="2466109"/>
+            <a:ext cx="0" cy="1027885"/>
+          </a:xfrm>
+          <a:prstGeom prst="line">
+            <a:avLst/>
+          </a:prstGeom>
+          <a:ln w="19050"/>
+        </p:spPr>
+        <p:style>
+          <a:lnRef idx="1">
+            <a:schemeClr val="accent1"/>
+          </a:lnRef>
+          <a:fillRef idx="0">
+            <a:schemeClr val="accent1"/>
+          </a:fillRef>
+          <a:effectRef idx="0">
+            <a:schemeClr val="accent1"/>
+          </a:effectRef>
+          <a:fontRef idx="minor">
+            <a:schemeClr val="tx1"/>
+          </a:fontRef>
+        </p:style>
+      </p:cxnSp>
+      <p:sp>
+        <p:nvSpPr>
+          <p:cNvPr id="27" name="TextBox 70">
+            <a:extLst>
+              <a:ext uri="{FF2B5EF4-FFF2-40B4-BE49-F238E27FC236}">
+                <a16:creationId xmlns:a16="http://schemas.microsoft.com/office/drawing/2014/main" id="{34CAB018-AA64-7F14-C3DB-AAD0CDC90EE4}"/>
+              </a:ext>
+            </a:extLst>
+          </p:cNvPr>
+          <p:cNvSpPr txBox="1"/>
+          <p:nvPr/>
+        </p:nvSpPr>
+        <p:spPr>
+          <a:xfrm>
+            <a:off x="6175676" y="4741012"/>
+            <a:ext cx="356188" cy="276999"/>
+          </a:xfrm>
+          <a:prstGeom prst="rect">
+            <a:avLst/>
+          </a:prstGeom>
+          <a:noFill/>
+        </p:spPr>
+        <p:txBody>
+          <a:bodyPr wrap="none" rtlCol="0">
+            <a:spAutoFit/>
+          </a:bodyPr>
+          <a:lstStyle/>
+          <a:p>
+            <a:r>
+              <a:rPr lang="en-US" sz="1200" dirty="0"/>
+              <a:t>(1)</a:t>
+            </a:r>
+            <a:endParaRPr lang="en-GB" sz="1200" dirty="0"/>
+          </a:p>
+        </p:txBody>
+      </p:sp>
+      <p:sp>
+        <p:nvSpPr>
+          <p:cNvPr id="28" name="TextBox 70">
+            <a:extLst>
+              <a:ext uri="{FF2B5EF4-FFF2-40B4-BE49-F238E27FC236}">
+                <a16:creationId xmlns:a16="http://schemas.microsoft.com/office/drawing/2014/main" id="{23064AB1-57E4-029A-74BC-F5B3BACF3C71}"/>
+              </a:ext>
+            </a:extLst>
+          </p:cNvPr>
+          <p:cNvSpPr txBox="1"/>
+          <p:nvPr/>
+        </p:nvSpPr>
+        <p:spPr>
+          <a:xfrm>
+            <a:off x="346654" y="3419212"/>
+            <a:ext cx="356188" cy="276999"/>
+          </a:xfrm>
+          <a:prstGeom prst="rect">
+            <a:avLst/>
+          </a:prstGeom>
+          <a:noFill/>
+        </p:spPr>
+        <p:txBody>
+          <a:bodyPr wrap="none" rtlCol="0">
+            <a:spAutoFit/>
+          </a:bodyPr>
+          <a:lstStyle/>
+          <a:p>
+            <a:r>
+              <a:rPr lang="en-US" sz="1200" dirty="0"/>
+              <a:t>(1)</a:t>
             </a:r>
             <a:endParaRPr lang="en-GB" sz="1200" dirty="0"/>
           </a:p>

</xml_diff>